<commit_message>
@carlyledavis:  Added configuration for handling flipped routes.
</commit_message>
<xml_diff>
--- a/services/studio/src/test/resources/initialize/WAS-42.pptx
+++ b/services/studio/src/test/resources/initialize/WAS-42.pptx
@@ -270,7 +270,7 @@
               <a:pPr>
                 <a:defRPr/>
               </a:pPr>
-              <a:t>1/21/19</a:t>
+              <a:t>1/22/19</a:t>
             </a:fld>
             <a:endParaRPr lang="en-US"/>
           </a:p>
@@ -650,7 +650,7 @@
               </a14:hiddenFill>
             </a:ext>
             <a:ext uri="{FAA26D3D-D897-4be2-8F04-BA451C77F1D7}">
-              <ma14:placeholderFlag xmlns:ma14="http://schemas.microsoft.com/office/mac/drawingml/2011/main" xmlns="" val="1"/>
+              <ma14:placeholderFlag xmlns="" xmlns:ma14="http://schemas.microsoft.com/office/mac/drawingml/2011/main" val="1"/>
             </a:ext>
           </a:extLst>
         </p:spPr>
@@ -686,7 +686,7 @@
               </a14:hiddenLine>
             </a:ext>
             <a:ext uri="{FAA26D3D-D897-4be2-8F04-BA451C77F1D7}">
-              <ma14:placeholderFlag xmlns:ma14="http://schemas.microsoft.com/office/mac/drawingml/2011/main" xmlns="" val="1"/>
+              <ma14:placeholderFlag xmlns="" xmlns:ma14="http://schemas.microsoft.com/office/mac/drawingml/2011/main" val="1"/>
             </a:ext>
           </a:extLst>
         </p:spPr>
@@ -967,7 +967,7 @@
               <a:pPr>
                 <a:defRPr/>
               </a:pPr>
-              <a:t>1/21/19</a:t>
+              <a:t>1/22/19</a:t>
             </a:fld>
             <a:endParaRPr lang="en-US" dirty="0"/>
           </a:p>
@@ -1180,7 +1180,7 @@
               <a:pPr>
                 <a:defRPr/>
               </a:pPr>
-              <a:t>1/21/19</a:t>
+              <a:t>1/22/19</a:t>
             </a:fld>
             <a:endParaRPr lang="en-US" dirty="0"/>
           </a:p>
@@ -1403,7 +1403,7 @@
               <a:pPr>
                 <a:defRPr/>
               </a:pPr>
-              <a:t>1/21/19</a:t>
+              <a:t>1/22/19</a:t>
             </a:fld>
             <a:endParaRPr lang="en-US" dirty="0"/>
           </a:p>
@@ -1616,7 +1616,7 @@
               <a:pPr>
                 <a:defRPr/>
               </a:pPr>
-              <a:t>1/21/19</a:t>
+              <a:t>1/22/19</a:t>
             </a:fld>
             <a:endParaRPr lang="en-US" dirty="0"/>
           </a:p>
@@ -1906,7 +1906,7 @@
               <a:pPr>
                 <a:defRPr/>
               </a:pPr>
-              <a:t>1/21/19</a:t>
+              <a:t>1/22/19</a:t>
             </a:fld>
             <a:endParaRPr lang="en-US" dirty="0"/>
           </a:p>
@@ -2236,7 +2236,7 @@
               <a:pPr>
                 <a:defRPr/>
               </a:pPr>
-              <a:t>1/21/19</a:t>
+              <a:t>1/22/19</a:t>
             </a:fld>
             <a:endParaRPr lang="en-US" dirty="0"/>
           </a:p>
@@ -2705,7 +2705,7 @@
               <a:pPr>
                 <a:defRPr/>
               </a:pPr>
-              <a:t>1/21/19</a:t>
+              <a:t>1/22/19</a:t>
             </a:fld>
             <a:endParaRPr lang="en-US" dirty="0"/>
           </a:p>
@@ -2867,7 +2867,7 @@
               <a:pPr>
                 <a:defRPr/>
               </a:pPr>
-              <a:t>1/21/19</a:t>
+              <a:t>1/22/19</a:t>
             </a:fld>
             <a:endParaRPr lang="en-US" dirty="0"/>
           </a:p>
@@ -3007,7 +3007,7 @@
               <a:pPr>
                 <a:defRPr/>
               </a:pPr>
-              <a:t>1/21/19</a:t>
+              <a:t>1/22/19</a:t>
             </a:fld>
             <a:endParaRPr lang="en-US" dirty="0"/>
           </a:p>
@@ -3327,7 +3327,7 @@
               <a:pPr>
                 <a:defRPr/>
               </a:pPr>
-              <a:t>1/21/19</a:t>
+              <a:t>1/22/19</a:t>
             </a:fld>
             <a:endParaRPr lang="en-US" dirty="0"/>
           </a:p>
@@ -3627,7 +3627,7 @@
               <a:pPr>
                 <a:defRPr/>
               </a:pPr>
-              <a:t>1/21/19</a:t>
+              <a:t>1/22/19</a:t>
             </a:fld>
             <a:endParaRPr lang="en-US" dirty="0"/>
           </a:p>
@@ -3783,7 +3783,7 @@
               </a14:hiddenLine>
             </a:ext>
             <a:ext uri="{FAA26D3D-D897-4be2-8F04-BA451C77F1D7}">
-              <ma14:placeholderFlag xmlns:ma14="http://schemas.microsoft.com/office/mac/drawingml/2011/main" xmlns="" val="1"/>
+              <ma14:placeholderFlag xmlns="" xmlns:ma14="http://schemas.microsoft.com/office/mac/drawingml/2011/main" val="1"/>
             </a:ext>
           </a:extLst>
         </p:spPr>
@@ -3844,7 +3844,7 @@
               </a14:hiddenLine>
             </a:ext>
             <a:ext uri="{FAA26D3D-D897-4be2-8F04-BA451C77F1D7}">
-              <ma14:placeholderFlag xmlns:ma14="http://schemas.microsoft.com/office/mac/drawingml/2011/main" xmlns="" val="1"/>
+              <ma14:placeholderFlag xmlns="" xmlns:ma14="http://schemas.microsoft.com/office/mac/drawingml/2011/main" val="1"/>
             </a:ext>
           </a:extLst>
         </p:spPr>
@@ -3948,7 +3948,7 @@
               <a:pPr>
                 <a:defRPr/>
               </a:pPr>
-              <a:t>1/21/19</a:t>
+              <a:t>1/22/19</a:t>
             </a:fld>
             <a:endParaRPr lang="en-US" dirty="0"/>
           </a:p>
@@ -6435,8 +6435,8 @@
         </p:nvCxnSpPr>
         <p:spPr>
           <a:xfrm flipH="1">
-            <a:off x="10253472" y="2333625"/>
-            <a:ext cx="1897253" cy="48223"/>
+            <a:off x="10081894" y="2302791"/>
+            <a:ext cx="2092326" cy="0"/>
           </a:xfrm>
           <a:prstGeom prst="line">
             <a:avLst/>

</xml_diff>

<commit_message>
@carlyledavis:  Added coverage reporting.
</commit_message>
<xml_diff>
--- a/services/studio/src/test/resources/initialize/WAS-42.pptx
+++ b/services/studio/src/test/resources/initialize/WAS-42.pptx
@@ -270,7 +270,7 @@
               <a:pPr>
                 <a:defRPr/>
               </a:pPr>
-              <a:t>1/22/19</a:t>
+              <a:t>2/27/19</a:t>
             </a:fld>
             <a:endParaRPr lang="en-US"/>
           </a:p>
@@ -650,7 +650,7 @@
               </a14:hiddenFill>
             </a:ext>
             <a:ext uri="{FAA26D3D-D897-4be2-8F04-BA451C77F1D7}">
-              <ma14:placeholderFlag xmlns="" xmlns:ma14="http://schemas.microsoft.com/office/mac/drawingml/2011/main" val="1"/>
+              <ma14:placeholderFlag xmlns:ma14="http://schemas.microsoft.com/office/mac/drawingml/2011/main" xmlns="" val="1"/>
             </a:ext>
           </a:extLst>
         </p:spPr>
@@ -686,7 +686,7 @@
               </a14:hiddenLine>
             </a:ext>
             <a:ext uri="{FAA26D3D-D897-4be2-8F04-BA451C77F1D7}">
-              <ma14:placeholderFlag xmlns="" xmlns:ma14="http://schemas.microsoft.com/office/mac/drawingml/2011/main" val="1"/>
+              <ma14:placeholderFlag xmlns:ma14="http://schemas.microsoft.com/office/mac/drawingml/2011/main" xmlns="" val="1"/>
             </a:ext>
           </a:extLst>
         </p:spPr>
@@ -967,7 +967,7 @@
               <a:pPr>
                 <a:defRPr/>
               </a:pPr>
-              <a:t>1/22/19</a:t>
+              <a:t>2/27/19</a:t>
             </a:fld>
             <a:endParaRPr lang="en-US" dirty="0"/>
           </a:p>
@@ -1180,7 +1180,7 @@
               <a:pPr>
                 <a:defRPr/>
               </a:pPr>
-              <a:t>1/22/19</a:t>
+              <a:t>2/27/19</a:t>
             </a:fld>
             <a:endParaRPr lang="en-US" dirty="0"/>
           </a:p>
@@ -1403,7 +1403,7 @@
               <a:pPr>
                 <a:defRPr/>
               </a:pPr>
-              <a:t>1/22/19</a:t>
+              <a:t>2/27/19</a:t>
             </a:fld>
             <a:endParaRPr lang="en-US" dirty="0"/>
           </a:p>
@@ -1616,7 +1616,7 @@
               <a:pPr>
                 <a:defRPr/>
               </a:pPr>
-              <a:t>1/22/19</a:t>
+              <a:t>2/27/19</a:t>
             </a:fld>
             <a:endParaRPr lang="en-US" dirty="0"/>
           </a:p>
@@ -1906,7 +1906,7 @@
               <a:pPr>
                 <a:defRPr/>
               </a:pPr>
-              <a:t>1/22/19</a:t>
+              <a:t>2/27/19</a:t>
             </a:fld>
             <a:endParaRPr lang="en-US" dirty="0"/>
           </a:p>
@@ -2236,7 +2236,7 @@
               <a:pPr>
                 <a:defRPr/>
               </a:pPr>
-              <a:t>1/22/19</a:t>
+              <a:t>2/27/19</a:t>
             </a:fld>
             <a:endParaRPr lang="en-US" dirty="0"/>
           </a:p>
@@ -2705,7 +2705,7 @@
               <a:pPr>
                 <a:defRPr/>
               </a:pPr>
-              <a:t>1/22/19</a:t>
+              <a:t>2/27/19</a:t>
             </a:fld>
             <a:endParaRPr lang="en-US" dirty="0"/>
           </a:p>
@@ -2867,7 +2867,7 @@
               <a:pPr>
                 <a:defRPr/>
               </a:pPr>
-              <a:t>1/22/19</a:t>
+              <a:t>2/27/19</a:t>
             </a:fld>
             <a:endParaRPr lang="en-US" dirty="0"/>
           </a:p>
@@ -3007,7 +3007,7 @@
               <a:pPr>
                 <a:defRPr/>
               </a:pPr>
-              <a:t>1/22/19</a:t>
+              <a:t>2/27/19</a:t>
             </a:fld>
             <a:endParaRPr lang="en-US" dirty="0"/>
           </a:p>
@@ -3327,7 +3327,7 @@
               <a:pPr>
                 <a:defRPr/>
               </a:pPr>
-              <a:t>1/22/19</a:t>
+              <a:t>2/27/19</a:t>
             </a:fld>
             <a:endParaRPr lang="en-US" dirty="0"/>
           </a:p>
@@ -3627,7 +3627,7 @@
               <a:pPr>
                 <a:defRPr/>
               </a:pPr>
-              <a:t>1/22/19</a:t>
+              <a:t>2/27/19</a:t>
             </a:fld>
             <a:endParaRPr lang="en-US" dirty="0"/>
           </a:p>
@@ -3783,7 +3783,7 @@
               </a14:hiddenLine>
             </a:ext>
             <a:ext uri="{FAA26D3D-D897-4be2-8F04-BA451C77F1D7}">
-              <ma14:placeholderFlag xmlns="" xmlns:ma14="http://schemas.microsoft.com/office/mac/drawingml/2011/main" val="1"/>
+              <ma14:placeholderFlag xmlns:ma14="http://schemas.microsoft.com/office/mac/drawingml/2011/main" xmlns="" val="1"/>
             </a:ext>
           </a:extLst>
         </p:spPr>
@@ -3844,7 +3844,7 @@
               </a14:hiddenLine>
             </a:ext>
             <a:ext uri="{FAA26D3D-D897-4be2-8F04-BA451C77F1D7}">
-              <ma14:placeholderFlag xmlns="" xmlns:ma14="http://schemas.microsoft.com/office/mac/drawingml/2011/main" val="1"/>
+              <ma14:placeholderFlag xmlns:ma14="http://schemas.microsoft.com/office/mac/drawingml/2011/main" xmlns="" val="1"/>
             </a:ext>
           </a:extLst>
         </p:spPr>
@@ -3948,7 +3948,7 @@
               <a:pPr>
                 <a:defRPr/>
               </a:pPr>
-              <a:t>1/22/19</a:t>
+              <a:t>2/27/19</a:t>
             </a:fld>
             <a:endParaRPr lang="en-US" dirty="0"/>
           </a:p>
@@ -4494,6 +4494,36 @@
           <a:chExt cx="0" cy="0"/>
         </a:xfrm>
       </p:grpSpPr>
+      <p:pic>
+        <p:nvPicPr>
+          <p:cNvPr id="2" name="Picture 1">
+            <a:extLst>
+              <a:ext uri="{FF2B5EF4-FFF2-40B4-BE49-F238E27FC236}">
+                <a16:creationId xmlns:a16="http://schemas.microsoft.com/office/drawing/2014/main" id="{D4D3C780-98C2-0B47-9893-80DFE8BC2A54}"/>
+              </a:ext>
+            </a:extLst>
+          </p:cNvPr>
+          <p:cNvPicPr>
+            <a:picLocks noChangeAspect="1"/>
+          </p:cNvPicPr>
+          <p:nvPr/>
+        </p:nvPicPr>
+        <p:blipFill>
+          <a:blip r:embed="rId4"/>
+          <a:stretch>
+            <a:fillRect/>
+          </a:stretch>
+        </p:blipFill>
+        <p:spPr>
+          <a:xfrm>
+            <a:off x="5738264" y="6484675"/>
+            <a:ext cx="1270000" cy="1270000"/>
+          </a:xfrm>
+          <a:prstGeom prst="rect">
+            <a:avLst/>
+          </a:prstGeom>
+        </p:spPr>
+      </p:pic>
       <p:grpSp>
         <p:nvGrpSpPr>
           <p:cNvPr id="3079" name="Group 64"/>

</xml_diff>